<commit_message>
changes in ppt presentation and report, bar charts added
</commit_message>
<xml_diff>
--- a/Project Presentation.pptx
+++ b/Project Presentation.pptx
@@ -15,10 +15,10 @@
     <p:sldId id="263" r:id="rId3"/>
     <p:sldId id="265" r:id="rId4"/>
     <p:sldId id="267" r:id="rId5"/>
-    <p:sldId id="268" r:id="rId6"/>
-    <p:sldId id="269" r:id="rId7"/>
-    <p:sldId id="270" r:id="rId8"/>
-    <p:sldId id="271" r:id="rId9"/>
+    <p:sldId id="274" r:id="rId6"/>
+    <p:sldId id="271" r:id="rId7"/>
+    <p:sldId id="272" r:id="rId8"/>
+    <p:sldId id="273" r:id="rId9"/>
   </p:sldIdLst>
   <p:sldSz cx="9144000" cy="5149850"/>
   <p:notesSz cx="9144000" cy="5149850"/>
@@ -210,7 +210,7 @@
           <a:p>
             <a:fld id="{54FF0F97-4BCE-4E22-98D8-1CDE1F1A7A60}" type="datetimeFigureOut">
               <a:rPr lang="en-US" smtClean="0"/>
-              <a:t>7/31/2024</a:t>
+              <a:t>8/15/2024</a:t>
             </a:fld>
             <a:endParaRPr lang="en-US"/>
           </a:p>
@@ -379,7 +379,7 @@
           <a:p>
             <a:fld id="{DCACED07-ADED-1945-A849-D40B2D3DE06D}" type="datetimeFigureOut">
               <a:rPr lang="de-DE" smtClean="0"/>
-              <a:t>31.07.2024</a:t>
+              <a:t>14.08.2024</a:t>
             </a:fld>
             <a:endParaRPr lang="de-DE"/>
           </a:p>
@@ -1174,7 +1174,7 @@
     </p:spTree>
     <p:extLst>
       <p:ext uri="{BB962C8B-B14F-4D97-AF65-F5344CB8AC3E}">
-        <p14:creationId xmlns:p14="http://schemas.microsoft.com/office/powerpoint/2010/main" val="1872881788"/>
+        <p14:creationId xmlns:p14="http://schemas.microsoft.com/office/powerpoint/2010/main" val="3265613775"/>
       </p:ext>
     </p:extLst>
   </p:cSld>
@@ -1285,7 +1285,7 @@
     </p:spTree>
     <p:extLst>
       <p:ext uri="{BB962C8B-B14F-4D97-AF65-F5344CB8AC3E}">
-        <p14:creationId xmlns:p14="http://schemas.microsoft.com/office/powerpoint/2010/main" val="2157867601"/>
+        <p14:creationId xmlns:p14="http://schemas.microsoft.com/office/powerpoint/2010/main" val="604684309"/>
       </p:ext>
     </p:extLst>
   </p:cSld>
@@ -1396,7 +1396,7 @@
     </p:spTree>
     <p:extLst>
       <p:ext uri="{BB962C8B-B14F-4D97-AF65-F5344CB8AC3E}">
-        <p14:creationId xmlns:p14="http://schemas.microsoft.com/office/powerpoint/2010/main" val="2924028332"/>
+        <p14:creationId xmlns:p14="http://schemas.microsoft.com/office/powerpoint/2010/main" val="219817083"/>
       </p:ext>
     </p:extLst>
   </p:cSld>
@@ -1507,7 +1507,7 @@
     </p:spTree>
     <p:extLst>
       <p:ext uri="{BB962C8B-B14F-4D97-AF65-F5344CB8AC3E}">
-        <p14:creationId xmlns:p14="http://schemas.microsoft.com/office/powerpoint/2010/main" val="604684309"/>
+        <p14:creationId xmlns:p14="http://schemas.microsoft.com/office/powerpoint/2010/main" val="1931661569"/>
       </p:ext>
     </p:extLst>
   </p:cSld>
@@ -3558,7 +3558,7 @@
         </p:nvSpPr>
         <p:spPr>
           <a:xfrm>
-            <a:off x="407265" y="669925"/>
+            <a:off x="290354" y="365125"/>
             <a:ext cx="8305401" cy="3352800"/>
           </a:xfrm>
         </p:spPr>
@@ -3624,10 +3624,10 @@
       </p:sp>
       <p:pic>
         <p:nvPicPr>
-          <p:cNvPr id="9" name="Picture 8">
+          <p:cNvPr id="5" name="Content Placeholder 5" descr="A screenshot of a table&#10;&#10;Description automatically generated">
             <a:extLst>
               <a:ext uri="{FF2B5EF4-FFF2-40B4-BE49-F238E27FC236}">
-                <a16:creationId xmlns:a16="http://schemas.microsoft.com/office/drawing/2014/main" id="{366412A4-E0A4-2101-6BED-DA2B95846798}"/>
+                <a16:creationId xmlns:a16="http://schemas.microsoft.com/office/drawing/2014/main" id="{BA60FFB3-4846-3EA6-2AD1-3A0A68D8B148}"/>
               </a:ext>
             </a:extLst>
           </p:cNvPr>
@@ -3637,15 +3637,21 @@
           <p:nvPr/>
         </p:nvPicPr>
         <p:blipFill>
-          <a:blip r:embed="rId3"/>
+          <a:blip r:embed="rId3">
+            <a:extLst>
+              <a:ext uri="{28A0092B-C50C-407E-A947-70E740481C1C}">
+                <a14:useLocalDpi xmlns:a14="http://schemas.microsoft.com/office/drawing/2010/main" val="0"/>
+              </a:ext>
+            </a:extLst>
+          </a:blip>
           <a:stretch>
             <a:fillRect/>
           </a:stretch>
         </p:blipFill>
         <p:spPr>
           <a:xfrm>
-            <a:off x="381000" y="1349267"/>
-            <a:ext cx="8602275" cy="2953162"/>
+            <a:off x="1219200" y="997047"/>
+            <a:ext cx="6477000" cy="3482877"/>
           </a:xfrm>
           <a:prstGeom prst="rect">
             <a:avLst/>
@@ -3722,11 +3728,7 @@
           <a:p>
             <a:r>
               <a:rPr lang="en-US" dirty="0"/>
-              <a:t>Key Findings</a:t>
-            </a:r>
-            <a:r>
-              <a:rPr lang="en-US" sz="1600" dirty="0"/>
-              <a:t>:</a:t>
+              <a:t>MUSHRA: Subjective Measures</a:t>
             </a:r>
             <a:br>
               <a:rPr lang="en-US" dirty="0"/>
@@ -3775,65 +3777,6 @@
             </a:pPr>
             <a:endParaRPr lang="en-US" dirty="0"/>
           </a:p>
-          <a:p>
-            <a:r>
-              <a:rPr lang="en-US" dirty="0"/>
-              <a:t>Quantization results in higher perceived loss than AAC encoding in most cases.</a:t>
-            </a:r>
-          </a:p>
-          <a:p>
-            <a:r>
-              <a:rPr lang="en-US" dirty="0"/>
-              <a:t>AAC consistently maintains better sound quality (Ratio &lt; 1).</a:t>
-            </a:r>
-          </a:p>
-          <a:p>
-            <a:endParaRPr lang="en-US" dirty="0"/>
-          </a:p>
-          <a:p>
-            <a:pPr marL="0" indent="0">
-              <a:buNone/>
-            </a:pPr>
-            <a:r>
-              <a:rPr lang="en-US" b="1" dirty="0"/>
-              <a:t>Observations by Genre:</a:t>
-            </a:r>
-          </a:p>
-          <a:p>
-            <a:pPr marL="0" indent="0">
-              <a:buNone/>
-            </a:pPr>
-            <a:endParaRPr lang="en-US" dirty="0"/>
-          </a:p>
-          <a:p>
-            <a:pPr algn="l" rtl="0" eaLnBrk="0" fontAlgn="base" hangingPunct="0">
-              <a:spcBef>
-                <a:spcPct val="0"/>
-              </a:spcBef>
-              <a:spcAft>
-                <a:spcPct val="0"/>
-              </a:spcAft>
-            </a:pPr>
-            <a:endParaRPr lang="en-US" sz="1800" kern="1200" spc="-5" dirty="0">
-              <a:latin typeface="Arial"/>
-              <a:cs typeface="Arial"/>
-            </a:endParaRPr>
-          </a:p>
-          <a:p>
-            <a:pPr marL="0" indent="0" algn="l" rtl="0" eaLnBrk="0" fontAlgn="base" hangingPunct="0">
-              <a:spcBef>
-                <a:spcPct val="0"/>
-              </a:spcBef>
-              <a:spcAft>
-                <a:spcPct val="0"/>
-              </a:spcAft>
-              <a:buNone/>
-            </a:pPr>
-            <a:endParaRPr lang="en-US" sz="1800" kern="1200" spc="-5" dirty="0">
-              <a:latin typeface="Arial"/>
-              <a:cs typeface="Arial"/>
-            </a:endParaRPr>
-          </a:p>
         </p:txBody>
       </p:sp>
       <p:sp>
@@ -3860,308 +3803,117 @@
           </a:p>
         </p:txBody>
       </p:sp>
-      <p:sp>
-        <p:nvSpPr>
-          <p:cNvPr id="2" name="Rectangle 1">
+      <p:pic>
+        <p:nvPicPr>
+          <p:cNvPr id="2" name="Content Placeholder 11" descr="A screenshot of a computer error&#10;&#10;Description automatically generated">
             <a:extLst>
               <a:ext uri="{FF2B5EF4-FFF2-40B4-BE49-F238E27FC236}">
-                <a16:creationId xmlns:a16="http://schemas.microsoft.com/office/drawing/2014/main" id="{F629B4F5-C4A7-B32F-DA14-3E438899C1C3}"/>
+                <a16:creationId xmlns:a16="http://schemas.microsoft.com/office/drawing/2014/main" id="{1C43526D-885D-6CD6-745C-79CF6FC29CFA}"/>
               </a:ext>
             </a:extLst>
           </p:cNvPr>
-          <p:cNvSpPr>
-            <a:spLocks noChangeArrowheads="1"/>
-          </p:cNvSpPr>
+          <p:cNvPicPr>
+            <a:picLocks noChangeAspect="1"/>
+          </p:cNvPicPr>
           <p:nvPr/>
-        </p:nvSpPr>
-        <p:spPr bwMode="auto">
+        </p:nvPicPr>
+        <p:blipFill>
+          <a:blip r:embed="rId3" cstate="print">
+            <a:extLst>
+              <a:ext uri="{28A0092B-C50C-407E-A947-70E740481C1C}">
+                <a14:useLocalDpi xmlns:a14="http://schemas.microsoft.com/office/drawing/2010/main" val="0"/>
+              </a:ext>
+            </a:extLst>
+          </a:blip>
+          <a:stretch>
+            <a:fillRect/>
+          </a:stretch>
+        </p:blipFill>
+        <p:spPr>
           <a:xfrm>
-            <a:off x="533400" y="2335164"/>
-            <a:ext cx="8077852" cy="2308324"/>
+            <a:off x="431334" y="1279687"/>
+            <a:ext cx="3707934" cy="2590475"/>
           </a:xfrm>
           <a:prstGeom prst="rect">
             <a:avLst/>
           </a:prstGeom>
-          <a:noFill/>
-          <a:ln>
-            <a:noFill/>
-          </a:ln>
-          <a:effectLst/>
-          <a:extLst>
-            <a:ext uri="{909E8E84-426E-40DD-AFC4-6F175D3DCCD1}">
-              <a14:hiddenFill xmlns:a14="http://schemas.microsoft.com/office/drawing/2010/main">
-                <a:solidFill>
-                  <a:schemeClr val="accent1"/>
-                </a:solidFill>
-              </a14:hiddenFill>
-            </a:ext>
-            <a:ext uri="{91240B29-F687-4F45-9708-019B960494DF}">
-              <a14:hiddenLine xmlns:a14="http://schemas.microsoft.com/office/drawing/2010/main" w="9525">
-                <a:solidFill>
-                  <a:schemeClr val="tx1"/>
-                </a:solidFill>
-                <a:miter lim="800000"/>
-                <a:headEnd/>
-                <a:tailEnd/>
-              </a14:hiddenLine>
-            </a:ext>
-            <a:ext uri="{AF507438-7753-43E0-B8FC-AC1667EBCBE1}">
-              <a14:hiddenEffects xmlns:a14="http://schemas.microsoft.com/office/drawing/2010/main">
-                <a:effectLst>
-                  <a:outerShdw dist="35921" dir="2700000" algn="ctr" rotWithShape="0">
-                    <a:schemeClr val="bg2"/>
-                  </a:outerShdw>
-                </a:effectLst>
-              </a14:hiddenEffects>
-            </a:ext>
-          </a:extLst>
         </p:spPr>
-        <p:txBody>
-          <a:bodyPr vert="horz" wrap="none" lIns="91440" tIns="45720" rIns="91440" bIns="45720" numCol="1" anchor="ctr" anchorCtr="0" compatLnSpc="1">
-            <a:prstTxWarp prst="textNoShape">
-              <a:avLst/>
-            </a:prstTxWarp>
-            <a:spAutoFit/>
-          </a:bodyPr>
-          <a:lstStyle/>
-          <a:p>
-            <a:pPr marL="182563" marR="0" lvl="0" indent="-182563" algn="l" defTabSz="914400" rtl="0" eaLnBrk="0" fontAlgn="base" latinLnBrk="0" hangingPunct="0">
-              <a:lnSpc>
-                <a:spcPct val="100000"/>
-              </a:lnSpc>
-              <a:spcBef>
-                <a:spcPct val="0"/>
-              </a:spcBef>
-              <a:spcAft>
-                <a:spcPct val="0"/>
-              </a:spcAft>
-              <a:buClr>
-                <a:srgbClr val="FF7900"/>
-              </a:buClr>
-              <a:buSzTx/>
-              <a:buFont typeface="Wingdings" pitchFamily="2" charset="2"/>
-              <a:buChar char="§"/>
-            </a:pPr>
-            <a:r>
-              <a:rPr lang="en-US" altLang="en-US" spc="-5" dirty="0">
-                <a:solidFill>
-                  <a:srgbClr val="003358"/>
-                </a:solidFill>
-                <a:latin typeface="Arial"/>
-                <a:cs typeface="Arial"/>
-              </a:rPr>
-              <a:t>Walking on </a:t>
-            </a:r>
-            <a:r>
-              <a:rPr lang="en-US" altLang="en-US" spc="-5" dirty="0" err="1">
-                <a:solidFill>
-                  <a:srgbClr val="003358"/>
-                </a:solidFill>
-                <a:latin typeface="Arial"/>
-                <a:cs typeface="Arial"/>
-              </a:rPr>
-              <a:t>Leafs</a:t>
-            </a:r>
-            <a:r>
-              <a:rPr lang="en-US" altLang="en-US" spc="-5" dirty="0">
-                <a:solidFill>
-                  <a:srgbClr val="003358"/>
-                </a:solidFill>
-                <a:latin typeface="Arial"/>
-                <a:cs typeface="Arial"/>
-              </a:rPr>
-              <a:t>:</a:t>
-            </a:r>
-          </a:p>
-          <a:p>
-            <a:pPr marL="488950" lvl="2" indent="-215900" eaLnBrk="0" fontAlgn="base" hangingPunct="0">
-              <a:spcBef>
-                <a:spcPct val="0"/>
-              </a:spcBef>
-              <a:spcAft>
-                <a:spcPct val="0"/>
-              </a:spcAft>
-              <a:buClr>
-                <a:srgbClr val="FF7900"/>
-              </a:buClr>
-              <a:buFont typeface="Symbol" pitchFamily="2" charset="2"/>
-              <a:buChar char="-"/>
-            </a:pPr>
-            <a:r>
-              <a:rPr lang="en-US" altLang="en-US" dirty="0">
-                <a:solidFill>
-                  <a:srgbClr val="003358"/>
-                </a:solidFill>
-                <a:latin typeface="Arial" panose="020B0604020202020204" pitchFamily="34" charset="0"/>
-                <a:cs typeface="Arial" panose="020B0604020202020204" pitchFamily="34" charset="0"/>
-              </a:rPr>
-              <a:t>AAC shows significantly lower PLOSS values compared to Quantization.</a:t>
-            </a:r>
-          </a:p>
-          <a:p>
-            <a:pPr marL="488950" lvl="2" indent="-215900" eaLnBrk="0" fontAlgn="base" hangingPunct="0">
-              <a:spcBef>
-                <a:spcPct val="0"/>
-              </a:spcBef>
-              <a:spcAft>
-                <a:spcPct val="0"/>
-              </a:spcAft>
-              <a:buClr>
-                <a:srgbClr val="FF7900"/>
-              </a:buClr>
-              <a:buFont typeface="Symbol" pitchFamily="2" charset="2"/>
-              <a:buChar char="-"/>
-            </a:pPr>
-            <a:r>
-              <a:rPr lang="en-US" altLang="en-US" dirty="0">
-                <a:solidFill>
-                  <a:srgbClr val="003358"/>
-                </a:solidFill>
-                <a:latin typeface="Arial" panose="020B0604020202020204" pitchFamily="34" charset="0"/>
-                <a:cs typeface="Arial" panose="020B0604020202020204" pitchFamily="34" charset="0"/>
-              </a:rPr>
-              <a:t>Ratio ranges from 0.0959 to 0.1101.</a:t>
-            </a:r>
-          </a:p>
-          <a:p>
-            <a:pPr marL="488950" lvl="2" indent="-215900" eaLnBrk="0" fontAlgn="base" hangingPunct="0">
-              <a:spcBef>
-                <a:spcPct val="0"/>
-              </a:spcBef>
-              <a:spcAft>
-                <a:spcPct val="0"/>
-              </a:spcAft>
-              <a:buClr>
-                <a:srgbClr val="FF7900"/>
-              </a:buClr>
-              <a:buFont typeface="Symbol" pitchFamily="2" charset="2"/>
-              <a:buChar char="-"/>
-            </a:pPr>
-            <a:endParaRPr lang="en-US" altLang="en-US" dirty="0">
-              <a:solidFill>
-                <a:srgbClr val="003358"/>
-              </a:solidFill>
-              <a:latin typeface="Arial" panose="020B0604020202020204" pitchFamily="34" charset="0"/>
-              <a:cs typeface="Arial" panose="020B0604020202020204" pitchFamily="34" charset="0"/>
-            </a:endParaRPr>
-          </a:p>
-          <a:p>
-            <a:pPr marL="182563" indent="-182563" eaLnBrk="0" fontAlgn="base" hangingPunct="0">
-              <a:spcBef>
-                <a:spcPct val="0"/>
-              </a:spcBef>
-              <a:spcAft>
-                <a:spcPct val="0"/>
-              </a:spcAft>
-              <a:buClr>
-                <a:srgbClr val="FF7900"/>
-              </a:buClr>
-              <a:buFont typeface="Wingdings" pitchFamily="2" charset="2"/>
-              <a:buChar char="§"/>
-            </a:pPr>
-            <a:r>
-              <a:rPr lang="en-US" altLang="en-US" spc="-5" dirty="0">
-                <a:solidFill>
-                  <a:srgbClr val="003358"/>
-                </a:solidFill>
-                <a:latin typeface="Arial"/>
-                <a:cs typeface="Arial"/>
-              </a:rPr>
-              <a:t>Smoothie:</a:t>
-            </a:r>
-          </a:p>
-          <a:p>
-            <a:pPr marL="488950" marR="0" lvl="2" indent="-215900" eaLnBrk="0" fontAlgn="base" hangingPunct="0">
-              <a:lnSpc>
-                <a:spcPct val="100000"/>
-              </a:lnSpc>
-              <a:spcBef>
-                <a:spcPct val="0"/>
-              </a:spcBef>
-              <a:spcAft>
-                <a:spcPct val="0"/>
-              </a:spcAft>
-              <a:buClr>
-                <a:srgbClr val="FF7900"/>
-              </a:buClr>
-              <a:buSzTx/>
-              <a:buFont typeface="Symbol" pitchFamily="2" charset="2"/>
-              <a:buChar char="-"/>
-            </a:pPr>
-            <a:r>
-              <a:rPr lang="en-US" altLang="en-US" dirty="0">
-                <a:solidFill>
-                  <a:srgbClr val="003358"/>
-                </a:solidFill>
-                <a:latin typeface="Arial" panose="020B0604020202020204" pitchFamily="34" charset="0"/>
-                <a:cs typeface="Arial" panose="020B0604020202020204" pitchFamily="34" charset="0"/>
-              </a:rPr>
-              <a:t>Mixed results; some files show higher PLOSS with AAC.</a:t>
-            </a:r>
-          </a:p>
-          <a:p>
-            <a:pPr marL="488950" marR="0" lvl="2" indent="-215900" eaLnBrk="0" fontAlgn="base" hangingPunct="0">
-              <a:lnSpc>
-                <a:spcPct val="100000"/>
-              </a:lnSpc>
-              <a:spcBef>
-                <a:spcPct val="0"/>
-              </a:spcBef>
-              <a:spcAft>
-                <a:spcPct val="0"/>
-              </a:spcAft>
-              <a:buClr>
-                <a:srgbClr val="FF7900"/>
-              </a:buClr>
-              <a:buSzTx/>
-              <a:buFont typeface="Symbol" pitchFamily="2" charset="2"/>
-              <a:buChar char="-"/>
-            </a:pPr>
-            <a:r>
-              <a:rPr lang="en-US" altLang="en-US" dirty="0">
-                <a:solidFill>
-                  <a:srgbClr val="003358"/>
-                </a:solidFill>
-                <a:latin typeface="Arial" panose="020B0604020202020204" pitchFamily="34" charset="0"/>
-                <a:cs typeface="Arial" panose="020B0604020202020204" pitchFamily="34" charset="0"/>
-              </a:rPr>
-              <a:t>Ratios up to 1.2292, indicating higher perceived loss in some cases.</a:t>
-            </a:r>
-          </a:p>
-          <a:p>
-            <a:pPr marL="0" marR="0" lvl="0" indent="0" algn="l" defTabSz="914400" rtl="0" eaLnBrk="0" fontAlgn="base" latinLnBrk="0" hangingPunct="0">
-              <a:lnSpc>
-                <a:spcPct val="100000"/>
-              </a:lnSpc>
-              <a:spcBef>
-                <a:spcPct val="0"/>
-              </a:spcBef>
-              <a:spcAft>
-                <a:spcPct val="0"/>
-              </a:spcAft>
-              <a:buClrTx/>
-              <a:buSzTx/>
-              <a:buFontTx/>
-              <a:buNone/>
-              <a:tabLst/>
-            </a:pPr>
-            <a:endParaRPr kumimoji="0" lang="en-US" altLang="en-US" sz="1800" b="0" i="0" u="none" strike="noStrike" cap="none" normalizeH="0" baseline="0" dirty="0">
-              <a:ln>
-                <a:noFill/>
-              </a:ln>
-              <a:solidFill>
-                <a:schemeClr val="tx1"/>
-              </a:solidFill>
-              <a:effectLst/>
-              <a:latin typeface="Arial" panose="020B0604020202020204" pitchFamily="34" charset="0"/>
-            </a:endParaRPr>
-          </a:p>
-        </p:txBody>
-      </p:sp>
+      </p:pic>
+      <p:pic>
+        <p:nvPicPr>
+          <p:cNvPr id="4" name="Picture 3" descr="A screenshot of a computer&#10;&#10;Description automatically generated">
+            <a:extLst>
+              <a:ext uri="{FF2B5EF4-FFF2-40B4-BE49-F238E27FC236}">
+                <a16:creationId xmlns:a16="http://schemas.microsoft.com/office/drawing/2014/main" id="{63621C7F-63CF-D716-8D0C-CDB2B0310A91}"/>
+              </a:ext>
+            </a:extLst>
+          </p:cNvPr>
+          <p:cNvPicPr>
+            <a:picLocks noChangeAspect="1"/>
+          </p:cNvPicPr>
+          <p:nvPr/>
+        </p:nvPicPr>
+        <p:blipFill>
+          <a:blip r:embed="rId4" cstate="print">
+            <a:extLst>
+              <a:ext uri="{28A0092B-C50C-407E-A947-70E740481C1C}">
+                <a14:useLocalDpi xmlns:a14="http://schemas.microsoft.com/office/drawing/2010/main" val="0"/>
+              </a:ext>
+            </a:extLst>
+          </a:blip>
+          <a:stretch>
+            <a:fillRect/>
+          </a:stretch>
+        </p:blipFill>
+        <p:spPr>
+          <a:xfrm>
+            <a:off x="4185943" y="855753"/>
+            <a:ext cx="4374557" cy="2014542"/>
+          </a:xfrm>
+          <a:prstGeom prst="rect">
+            <a:avLst/>
+          </a:prstGeom>
+        </p:spPr>
+      </p:pic>
+      <p:pic>
+        <p:nvPicPr>
+          <p:cNvPr id="5" name="Picture 4" descr="A screenshot of a computer&#10;&#10;Description automatically generated">
+            <a:extLst>
+              <a:ext uri="{FF2B5EF4-FFF2-40B4-BE49-F238E27FC236}">
+                <a16:creationId xmlns:a16="http://schemas.microsoft.com/office/drawing/2014/main" id="{65457FAC-ABB1-9C96-F286-FE1FF1BDA9C3}"/>
+              </a:ext>
+            </a:extLst>
+          </p:cNvPr>
+          <p:cNvPicPr>
+            <a:picLocks noChangeAspect="1"/>
+          </p:cNvPicPr>
+          <p:nvPr/>
+        </p:nvPicPr>
+        <p:blipFill rotWithShape="1">
+          <a:blip r:embed="rId5">
+            <a:extLst>
+              <a:ext uri="{28A0092B-C50C-407E-A947-70E740481C1C}">
+                <a14:useLocalDpi xmlns:a14="http://schemas.microsoft.com/office/drawing/2010/main" val="0"/>
+              </a:ext>
+            </a:extLst>
+          </a:blip>
+          <a:srcRect b="43300"/>
+          <a:stretch/>
+        </p:blipFill>
+        <p:spPr>
+          <a:xfrm>
+            <a:off x="4185943" y="2803525"/>
+            <a:ext cx="4384948" cy="1695739"/>
+          </a:xfrm>
+          <a:prstGeom prst="rect">
+            <a:avLst/>
+          </a:prstGeom>
+        </p:spPr>
+      </p:pic>
     </p:spTree>
     <p:extLst>
       <p:ext uri="{BB962C8B-B14F-4D97-AF65-F5344CB8AC3E}">
-        <p14:creationId xmlns:p14="http://schemas.microsoft.com/office/powerpoint/2010/main" val="2477974953"/>
+        <p14:creationId xmlns:p14="http://schemas.microsoft.com/office/powerpoint/2010/main" val="44473989"/>
       </p:ext>
     </p:extLst>
   </p:cSld>
@@ -4219,94 +3971,30 @@
         <p:spPr>
           <a:xfrm>
             <a:off x="419302" y="243976"/>
-            <a:ext cx="8305401" cy="923330"/>
+            <a:ext cx="8305401" cy="2308324"/>
           </a:xfrm>
         </p:spPr>
         <p:txBody>
           <a:bodyPr/>
           <a:lstStyle/>
           <a:p>
+            <a:r>
+              <a:rPr lang="en-US" dirty="0"/>
+              <a:t>Comparison Graphs</a:t>
+            </a:r>
+            <a:br>
+              <a:rPr lang="en-US" dirty="0"/>
+            </a:br>
+            <a:br>
+              <a:rPr lang="en-US" dirty="0"/>
+            </a:br>
+            <a:br>
+              <a:rPr lang="en-US" dirty="0"/>
+            </a:br>
             <a:br>
               <a:rPr lang="en-US" dirty="0"/>
             </a:br>
             <a:endParaRPr lang="en-US" dirty="0"/>
-          </a:p>
-        </p:txBody>
-      </p:sp>
-      <p:sp>
-        <p:nvSpPr>
-          <p:cNvPr id="7" name="Content Placeholder 6">
-            <a:extLst>
-              <a:ext uri="{FF2B5EF4-FFF2-40B4-BE49-F238E27FC236}">
-                <a16:creationId xmlns:a16="http://schemas.microsoft.com/office/drawing/2014/main" id="{ABECAD67-C65D-48EA-9C63-EE7C87CF9C96}"/>
-              </a:ext>
-            </a:extLst>
-          </p:cNvPr>
-          <p:cNvSpPr>
-            <a:spLocks noGrp="1"/>
-          </p:cNvSpPr>
-          <p:nvPr>
-            <p:ph sz="quarter" idx="12"/>
-          </p:nvPr>
-        </p:nvSpPr>
-        <p:spPr>
-          <a:xfrm>
-            <a:off x="419297" y="232112"/>
-            <a:ext cx="8305401" cy="3352800"/>
-          </a:xfrm>
-        </p:spPr>
-        <p:txBody>
-          <a:bodyPr/>
-          <a:lstStyle/>
-          <a:p>
-            <a:pPr marL="0" indent="0">
-              <a:buNone/>
-            </a:pPr>
-            <a:endParaRPr lang="en-US" dirty="0"/>
-          </a:p>
-          <a:p>
-            <a:pPr marL="0" indent="0">
-              <a:buNone/>
-            </a:pPr>
-            <a:r>
-              <a:rPr lang="en-US" sz="2400" b="1" dirty="0"/>
-              <a:t>Observations by Genre: (continue)</a:t>
-            </a:r>
-          </a:p>
-          <a:p>
-            <a:pPr marL="0" indent="0">
-              <a:buNone/>
-            </a:pPr>
-            <a:endParaRPr lang="en-US" dirty="0"/>
-          </a:p>
-          <a:p>
-            <a:pPr algn="l" rtl="0" eaLnBrk="0" fontAlgn="base" hangingPunct="0">
-              <a:spcBef>
-                <a:spcPct val="0"/>
-              </a:spcBef>
-              <a:spcAft>
-                <a:spcPct val="0"/>
-              </a:spcAft>
-            </a:pPr>
-            <a:endParaRPr lang="en-US" sz="1800" kern="1200" spc="-5" dirty="0">
-              <a:latin typeface="Arial"/>
-              <a:cs typeface="Arial"/>
-            </a:endParaRPr>
-          </a:p>
-          <a:p>
-            <a:pPr marL="0" indent="0" algn="l" rtl="0" eaLnBrk="0" fontAlgn="base" hangingPunct="0">
-              <a:spcBef>
-                <a:spcPct val="0"/>
-              </a:spcBef>
-              <a:spcAft>
-                <a:spcPct val="0"/>
-              </a:spcAft>
-              <a:buNone/>
-            </a:pPr>
-            <a:endParaRPr lang="en-US" sz="1800" kern="1200" spc="-5" dirty="0">
-              <a:latin typeface="Arial"/>
-              <a:cs typeface="Arial"/>
-            </a:endParaRPr>
           </a:p>
         </p:txBody>
       </p:sp>
@@ -4334,299 +4022,82 @@
           </a:p>
         </p:txBody>
       </p:sp>
-      <p:sp>
-        <p:nvSpPr>
-          <p:cNvPr id="2" name="Rectangle 1">
+      <p:pic>
+        <p:nvPicPr>
+          <p:cNvPr id="5" name="Picture 4" descr="A graph of green and orange bars&#10;&#10;Description automatically generated">
             <a:extLst>
               <a:ext uri="{FF2B5EF4-FFF2-40B4-BE49-F238E27FC236}">
-                <a16:creationId xmlns:a16="http://schemas.microsoft.com/office/drawing/2014/main" id="{F629B4F5-C4A7-B32F-DA14-3E438899C1C3}"/>
+                <a16:creationId xmlns:a16="http://schemas.microsoft.com/office/drawing/2014/main" id="{3148D006-5C94-E858-61A4-E984635CB26F}"/>
               </a:ext>
             </a:extLst>
           </p:cNvPr>
-          <p:cNvSpPr>
-            <a:spLocks noChangeArrowheads="1"/>
-          </p:cNvSpPr>
+          <p:cNvPicPr>
+            <a:picLocks noChangeAspect="1"/>
+          </p:cNvPicPr>
           <p:nvPr/>
-        </p:nvSpPr>
-        <p:spPr bwMode="auto">
+        </p:nvPicPr>
+        <p:blipFill>
+          <a:blip r:embed="rId3">
+            <a:extLst>
+              <a:ext uri="{28A0092B-C50C-407E-A947-70E740481C1C}">
+                <a14:useLocalDpi xmlns:a14="http://schemas.microsoft.com/office/drawing/2010/main" val="0"/>
+              </a:ext>
+            </a:extLst>
+          </a:blip>
+          <a:stretch>
+            <a:fillRect/>
+          </a:stretch>
+        </p:blipFill>
+        <p:spPr>
           <a:xfrm>
-            <a:off x="467619" y="1083448"/>
-            <a:ext cx="7362272" cy="2585323"/>
+            <a:off x="254259" y="913528"/>
+            <a:ext cx="4167647" cy="3109197"/>
           </a:xfrm>
           <a:prstGeom prst="rect">
             <a:avLst/>
           </a:prstGeom>
-          <a:noFill/>
-          <a:ln>
-            <a:noFill/>
-          </a:ln>
-          <a:effectLst/>
-          <a:extLst>
-            <a:ext uri="{909E8E84-426E-40DD-AFC4-6F175D3DCCD1}">
-              <a14:hiddenFill xmlns:a14="http://schemas.microsoft.com/office/drawing/2010/main">
-                <a:solidFill>
-                  <a:schemeClr val="accent1"/>
-                </a:solidFill>
-              </a14:hiddenFill>
-            </a:ext>
-            <a:ext uri="{91240B29-F687-4F45-9708-019B960494DF}">
-              <a14:hiddenLine xmlns:a14="http://schemas.microsoft.com/office/drawing/2010/main" w="9525">
-                <a:solidFill>
-                  <a:schemeClr val="tx1"/>
-                </a:solidFill>
-                <a:miter lim="800000"/>
-                <a:headEnd/>
-                <a:tailEnd/>
-              </a14:hiddenLine>
-            </a:ext>
-            <a:ext uri="{AF507438-7753-43E0-B8FC-AC1667EBCBE1}">
-              <a14:hiddenEffects xmlns:a14="http://schemas.microsoft.com/office/drawing/2010/main">
-                <a:effectLst>
-                  <a:outerShdw dist="35921" dir="2700000" algn="ctr" rotWithShape="0">
-                    <a:schemeClr val="bg2"/>
-                  </a:outerShdw>
-                </a:effectLst>
-              </a14:hiddenEffects>
-            </a:ext>
-          </a:extLst>
         </p:spPr>
-        <p:txBody>
-          <a:bodyPr vert="horz" wrap="none" lIns="91440" tIns="45720" rIns="91440" bIns="45720" numCol="1" anchor="ctr" anchorCtr="0" compatLnSpc="1">
-            <a:prstTxWarp prst="textNoShape">
-              <a:avLst/>
-            </a:prstTxWarp>
-            <a:spAutoFit/>
-          </a:bodyPr>
-          <a:lstStyle/>
-          <a:p>
-            <a:pPr marL="182563" marR="0" lvl="0" indent="-182563" algn="l" defTabSz="914400" rtl="0" eaLnBrk="0" fontAlgn="base" latinLnBrk="0" hangingPunct="0">
-              <a:lnSpc>
-                <a:spcPct val="100000"/>
-              </a:lnSpc>
-              <a:spcBef>
-                <a:spcPct val="0"/>
-              </a:spcBef>
-              <a:spcAft>
-                <a:spcPct val="0"/>
-              </a:spcAft>
-              <a:buClr>
-                <a:srgbClr val="FF7900"/>
-              </a:buClr>
-              <a:buSzTx/>
-              <a:buFont typeface="Wingdings" pitchFamily="2" charset="2"/>
-              <a:buChar char="§"/>
-            </a:pPr>
-            <a:r>
-              <a:rPr lang="en-US" dirty="0"/>
-              <a:t>Drum Kit &amp; Traffic:</a:t>
-            </a:r>
-            <a:r>
-              <a:rPr lang="en-US" altLang="en-US" spc="-5" dirty="0">
-                <a:solidFill>
-                  <a:srgbClr val="003358"/>
-                </a:solidFill>
-                <a:latin typeface="Arial"/>
-                <a:cs typeface="Arial"/>
-              </a:rPr>
-              <a:t>:</a:t>
-            </a:r>
-          </a:p>
-          <a:p>
-            <a:pPr marL="488950" lvl="2" indent="-215900" eaLnBrk="0" fontAlgn="base" hangingPunct="0">
-              <a:spcBef>
-                <a:spcPct val="0"/>
-              </a:spcBef>
-              <a:spcAft>
-                <a:spcPct val="0"/>
-              </a:spcAft>
-              <a:buClr>
-                <a:srgbClr val="FF7900"/>
-              </a:buClr>
-              <a:buFont typeface="Symbol" pitchFamily="2" charset="2"/>
-              <a:buChar char="-"/>
-            </a:pPr>
-            <a:r>
-              <a:rPr lang="en-US" dirty="0"/>
-              <a:t>AAC consistently outperforms Quantization</a:t>
-            </a:r>
-            <a:endParaRPr lang="en-US" altLang="en-US" dirty="0">
-              <a:solidFill>
-                <a:srgbClr val="003358"/>
-              </a:solidFill>
-              <a:latin typeface="Arial" panose="020B0604020202020204" pitchFamily="34" charset="0"/>
-              <a:cs typeface="Arial" panose="020B0604020202020204" pitchFamily="34" charset="0"/>
-            </a:endParaRPr>
-          </a:p>
-          <a:p>
-            <a:pPr marL="488950" lvl="2" indent="-215900" eaLnBrk="0" fontAlgn="base" hangingPunct="0">
-              <a:spcBef>
-                <a:spcPct val="0"/>
-              </a:spcBef>
-              <a:spcAft>
-                <a:spcPct val="0"/>
-              </a:spcAft>
-              <a:buClr>
-                <a:srgbClr val="FF7900"/>
-              </a:buClr>
-              <a:buFont typeface="Symbol" pitchFamily="2" charset="2"/>
-              <a:buChar char="-"/>
-            </a:pPr>
-            <a:r>
-              <a:rPr lang="en-US" dirty="0"/>
-              <a:t>Significantly lower PLOSS values, e.g., Drum Kit (Ratio 0.0874 - 0.6366), </a:t>
-            </a:r>
-          </a:p>
-          <a:p>
-            <a:pPr marL="488950" lvl="2" indent="-215900" eaLnBrk="0" fontAlgn="base" hangingPunct="0">
-              <a:spcBef>
-                <a:spcPct val="0"/>
-              </a:spcBef>
-              <a:spcAft>
-                <a:spcPct val="0"/>
-              </a:spcAft>
-              <a:buClr>
-                <a:srgbClr val="FF7900"/>
-              </a:buClr>
-              <a:buFont typeface="Symbol" pitchFamily="2" charset="2"/>
-              <a:buChar char="-"/>
-            </a:pPr>
-            <a:r>
-              <a:rPr lang="en-US" dirty="0"/>
-              <a:t>Traffic (Ratio 0.0351 - 1.0165)</a:t>
-            </a:r>
-          </a:p>
-          <a:p>
-            <a:pPr marL="273050" lvl="2" eaLnBrk="0" fontAlgn="base" hangingPunct="0">
-              <a:spcBef>
-                <a:spcPct val="0"/>
-              </a:spcBef>
-              <a:spcAft>
-                <a:spcPct val="0"/>
-              </a:spcAft>
-              <a:buClr>
-                <a:srgbClr val="FF7900"/>
-              </a:buClr>
-            </a:pPr>
-            <a:endParaRPr lang="en-US" altLang="en-US" dirty="0">
-              <a:solidFill>
-                <a:srgbClr val="003358"/>
-              </a:solidFill>
-              <a:latin typeface="Arial" panose="020B0604020202020204" pitchFamily="34" charset="0"/>
-              <a:cs typeface="Arial" panose="020B0604020202020204" pitchFamily="34" charset="0"/>
-            </a:endParaRPr>
-          </a:p>
-          <a:p>
-            <a:pPr marL="182563" indent="-182563" eaLnBrk="0" fontAlgn="base" hangingPunct="0">
-              <a:spcBef>
-                <a:spcPct val="0"/>
-              </a:spcBef>
-              <a:spcAft>
-                <a:spcPct val="0"/>
-              </a:spcAft>
-              <a:buClr>
-                <a:srgbClr val="FF7900"/>
-              </a:buClr>
-              <a:buFont typeface="Wingdings" pitchFamily="2" charset="2"/>
-              <a:buChar char="§"/>
-            </a:pPr>
-            <a:r>
-              <a:rPr lang="en-US" altLang="en-US" spc="-5" dirty="0">
-                <a:solidFill>
-                  <a:srgbClr val="003358"/>
-                </a:solidFill>
-                <a:latin typeface="Arial"/>
-                <a:cs typeface="Arial"/>
-              </a:rPr>
-              <a:t>Drums:</a:t>
-            </a:r>
-          </a:p>
-          <a:p>
-            <a:pPr marL="488950" marR="0" lvl="2" indent="-215900" eaLnBrk="0" fontAlgn="base" hangingPunct="0">
-              <a:lnSpc>
-                <a:spcPct val="100000"/>
-              </a:lnSpc>
-              <a:spcBef>
-                <a:spcPct val="0"/>
-              </a:spcBef>
-              <a:spcAft>
-                <a:spcPct val="0"/>
-              </a:spcAft>
-              <a:buClr>
-                <a:srgbClr val="FF7900"/>
-              </a:buClr>
-              <a:buSzTx/>
-              <a:buFont typeface="Symbol" pitchFamily="2" charset="2"/>
-              <a:buChar char="-"/>
-            </a:pPr>
-            <a:r>
-              <a:rPr lang="en-US" dirty="0"/>
-              <a:t>AAC better preserves sound quality.</a:t>
-            </a:r>
-          </a:p>
-          <a:p>
-            <a:pPr marL="488950" marR="0" lvl="2" indent="-215900" eaLnBrk="0" fontAlgn="base" hangingPunct="0">
-              <a:lnSpc>
-                <a:spcPct val="100000"/>
-              </a:lnSpc>
-              <a:spcBef>
-                <a:spcPct val="0"/>
-              </a:spcBef>
-              <a:spcAft>
-                <a:spcPct val="0"/>
-              </a:spcAft>
-              <a:buClr>
-                <a:srgbClr val="FF7900"/>
-              </a:buClr>
-              <a:buSzTx/>
-              <a:buFont typeface="Symbol" pitchFamily="2" charset="2"/>
-              <a:buChar char="-"/>
-            </a:pPr>
-            <a:r>
-              <a:rPr lang="en-US" dirty="0"/>
-              <a:t>Ratios range from 0.0280 to 0.0540</a:t>
-            </a:r>
-            <a:endParaRPr lang="en-US" altLang="en-US" dirty="0">
-              <a:solidFill>
-                <a:srgbClr val="003358"/>
-              </a:solidFill>
-              <a:latin typeface="Arial" panose="020B0604020202020204" pitchFamily="34" charset="0"/>
-              <a:cs typeface="Arial" panose="020B0604020202020204" pitchFamily="34" charset="0"/>
-            </a:endParaRPr>
-          </a:p>
-          <a:p>
-            <a:pPr marL="0" marR="0" lvl="0" indent="0" algn="l" defTabSz="914400" rtl="0" eaLnBrk="0" fontAlgn="base" latinLnBrk="0" hangingPunct="0">
-              <a:lnSpc>
-                <a:spcPct val="100000"/>
-              </a:lnSpc>
-              <a:spcBef>
-                <a:spcPct val="0"/>
-              </a:spcBef>
-              <a:spcAft>
-                <a:spcPct val="0"/>
-              </a:spcAft>
-              <a:buClrTx/>
-              <a:buSzTx/>
-              <a:buFontTx/>
-              <a:buNone/>
-              <a:tabLst/>
-            </a:pPr>
-            <a:endParaRPr kumimoji="0" lang="en-US" altLang="en-US" sz="1800" b="0" i="0" u="none" strike="noStrike" cap="none" normalizeH="0" baseline="0" dirty="0">
-              <a:ln>
-                <a:noFill/>
-              </a:ln>
-              <a:solidFill>
-                <a:schemeClr val="tx1"/>
-              </a:solidFill>
-              <a:effectLst/>
-              <a:latin typeface="Arial" panose="020B0604020202020204" pitchFamily="34" charset="0"/>
-            </a:endParaRPr>
-          </a:p>
-        </p:txBody>
-      </p:sp>
+      </p:pic>
+      <p:pic>
+        <p:nvPicPr>
+          <p:cNvPr id="8" name="Picture 7" descr="A graph of traffic and reverb&#10;&#10;Description automatically generated">
+            <a:extLst>
+              <a:ext uri="{FF2B5EF4-FFF2-40B4-BE49-F238E27FC236}">
+                <a16:creationId xmlns:a16="http://schemas.microsoft.com/office/drawing/2014/main" id="{8D5CB889-1671-54F3-5B7C-2E1EA2AB1649}"/>
+              </a:ext>
+            </a:extLst>
+          </p:cNvPr>
+          <p:cNvPicPr>
+            <a:picLocks noChangeAspect="1"/>
+          </p:cNvPicPr>
+          <p:nvPr/>
+        </p:nvPicPr>
+        <p:blipFill>
+          <a:blip r:embed="rId4">
+            <a:extLst>
+              <a:ext uri="{28A0092B-C50C-407E-A947-70E740481C1C}">
+                <a14:useLocalDpi xmlns:a14="http://schemas.microsoft.com/office/drawing/2010/main" val="0"/>
+              </a:ext>
+            </a:extLst>
+          </a:blip>
+          <a:stretch>
+            <a:fillRect/>
+          </a:stretch>
+        </p:blipFill>
+        <p:spPr>
+          <a:xfrm>
+            <a:off x="4379101" y="867865"/>
+            <a:ext cx="4412472" cy="3200522"/>
+          </a:xfrm>
+          <a:prstGeom prst="rect">
+            <a:avLst/>
+          </a:prstGeom>
+        </p:spPr>
+      </p:pic>
     </p:spTree>
     <p:extLst>
       <p:ext uri="{BB962C8B-B14F-4D97-AF65-F5344CB8AC3E}">
-        <p14:creationId xmlns:p14="http://schemas.microsoft.com/office/powerpoint/2010/main" val="2034322737"/>
+        <p14:creationId xmlns:p14="http://schemas.microsoft.com/office/powerpoint/2010/main" val="2620491146"/>
       </p:ext>
     </p:extLst>
   </p:cSld>
@@ -4684,7 +4155,7 @@
         <p:spPr>
           <a:xfrm>
             <a:off x="419302" y="243976"/>
-            <a:ext cx="8305401" cy="1384995"/>
+            <a:ext cx="8305401" cy="2308324"/>
           </a:xfrm>
         </p:spPr>
         <p:txBody>
@@ -4693,8 +4164,14 @@
           <a:p>
             <a:r>
               <a:rPr lang="en-US" dirty="0"/>
-              <a:t>Conclusion</a:t>
-            </a:r>
+              <a:t>Comparison Graphs</a:t>
+            </a:r>
+            <a:br>
+              <a:rPr lang="en-US" dirty="0"/>
+            </a:br>
+            <a:br>
+              <a:rPr lang="en-US" dirty="0"/>
+            </a:br>
             <a:br>
               <a:rPr lang="en-US" dirty="0"/>
             </a:br>
@@ -4707,148 +4184,6 @@
       </p:sp>
       <p:sp>
         <p:nvSpPr>
-          <p:cNvPr id="7" name="Content Placeholder 6">
-            <a:extLst>
-              <a:ext uri="{FF2B5EF4-FFF2-40B4-BE49-F238E27FC236}">
-                <a16:creationId xmlns:a16="http://schemas.microsoft.com/office/drawing/2014/main" id="{ABECAD67-C65D-48EA-9C63-EE7C87CF9C96}"/>
-              </a:ext>
-            </a:extLst>
-          </p:cNvPr>
-          <p:cNvSpPr>
-            <a:spLocks noGrp="1"/>
-          </p:cNvSpPr>
-          <p:nvPr>
-            <p:ph sz="quarter" idx="12"/>
-          </p:nvPr>
-        </p:nvSpPr>
-        <p:spPr>
-          <a:xfrm>
-            <a:off x="381000" y="593725"/>
-            <a:ext cx="8305401" cy="3352800"/>
-          </a:xfrm>
-        </p:spPr>
-        <p:txBody>
-          <a:bodyPr/>
-          <a:lstStyle/>
-          <a:p>
-            <a:pPr marL="0" indent="0">
-              <a:buNone/>
-            </a:pPr>
-            <a:endParaRPr lang="en-US" sz="2000" dirty="0"/>
-          </a:p>
-          <a:p>
-            <a:pPr marL="0" indent="0" algn="l" rtl="0" eaLnBrk="0" fontAlgn="base" hangingPunct="0">
-              <a:spcBef>
-                <a:spcPct val="0"/>
-              </a:spcBef>
-              <a:spcAft>
-                <a:spcPct val="0"/>
-              </a:spcAft>
-              <a:buNone/>
-            </a:pPr>
-            <a:r>
-              <a:rPr lang="en-US" b="1" dirty="0"/>
-              <a:t>Overall Analysis:</a:t>
-            </a:r>
-          </a:p>
-          <a:p>
-            <a:pPr lvl="2" algn="l" rtl="0" eaLnBrk="0" fontAlgn="base" hangingPunct="0">
-              <a:spcBef>
-                <a:spcPct val="0"/>
-              </a:spcBef>
-              <a:spcAft>
-                <a:spcPct val="0"/>
-              </a:spcAft>
-            </a:pPr>
-            <a:r>
-              <a:rPr lang="en-US" sz="1800" dirty="0"/>
-              <a:t>Quantization leads to greater perceived loss compared to AAC.</a:t>
-            </a:r>
-          </a:p>
-          <a:p>
-            <a:pPr lvl="2" algn="l" rtl="0" eaLnBrk="0" fontAlgn="base" hangingPunct="0">
-              <a:spcBef>
-                <a:spcPct val="0"/>
-              </a:spcBef>
-              <a:spcAft>
-                <a:spcPct val="0"/>
-              </a:spcAft>
-            </a:pPr>
-            <a:r>
-              <a:rPr lang="en-US" sz="1800" dirty="0"/>
-              <a:t>Ratios (AAC/Quantized) &lt; 1 for most audio files, highlighting AAC’s effectiveness</a:t>
-            </a:r>
-          </a:p>
-          <a:p>
-            <a:pPr lvl="2" algn="l" rtl="0" eaLnBrk="0" fontAlgn="base" hangingPunct="0">
-              <a:spcBef>
-                <a:spcPct val="0"/>
-              </a:spcBef>
-              <a:spcAft>
-                <a:spcPct val="0"/>
-              </a:spcAft>
-            </a:pPr>
-            <a:endParaRPr lang="en-US" sz="1800" dirty="0"/>
-          </a:p>
-          <a:p>
-            <a:pPr marL="0" indent="0" algn="l" rtl="0" eaLnBrk="0" fontAlgn="base" hangingPunct="0">
-              <a:spcBef>
-                <a:spcPct val="0"/>
-              </a:spcBef>
-              <a:spcAft>
-                <a:spcPct val="0"/>
-              </a:spcAft>
-              <a:buNone/>
-            </a:pPr>
-            <a:r>
-              <a:rPr lang="en-US" b="1" dirty="0"/>
-              <a:t>Genre-Specific Observations:</a:t>
-            </a:r>
-          </a:p>
-          <a:p>
-            <a:pPr lvl="2" algn="l" rtl="0" eaLnBrk="0" fontAlgn="base" hangingPunct="0">
-              <a:spcBef>
-                <a:spcPct val="0"/>
-              </a:spcBef>
-              <a:spcAft>
-                <a:spcPct val="0"/>
-              </a:spcAft>
-            </a:pPr>
-            <a:r>
-              <a:rPr lang="en-US" sz="1800" dirty="0"/>
-              <a:t>"Smoothie" genre exhibits higher perceived loss with AAC in some cases..</a:t>
-            </a:r>
-          </a:p>
-          <a:p>
-            <a:pPr lvl="2" algn="l" rtl="0" eaLnBrk="0" fontAlgn="base" hangingPunct="0">
-              <a:spcBef>
-                <a:spcPct val="0"/>
-              </a:spcBef>
-              <a:spcAft>
-                <a:spcPct val="0"/>
-              </a:spcAft>
-            </a:pPr>
-            <a:r>
-              <a:rPr lang="en-US" sz="1800" dirty="0"/>
-              <a:t>"Drum Kit," "Traffic," and "Drums" genres show AAC significantly outperforms Quantization.</a:t>
-            </a:r>
-          </a:p>
-          <a:p>
-            <a:pPr marL="0" indent="0" algn="l" rtl="0" eaLnBrk="0" fontAlgn="base" hangingPunct="0">
-              <a:spcBef>
-                <a:spcPct val="0"/>
-              </a:spcBef>
-              <a:spcAft>
-                <a:spcPct val="0"/>
-              </a:spcAft>
-              <a:buNone/>
-            </a:pPr>
-            <a:endParaRPr lang="en-US" sz="1800" dirty="0"/>
-          </a:p>
-        </p:txBody>
-      </p:sp>
-      <p:sp>
-        <p:nvSpPr>
           <p:cNvPr id="3" name="Slide Number Placeholder 2"/>
           <p:cNvSpPr>
             <a:spLocks noGrp="1"/>
@@ -4871,10 +4206,82 @@
           </a:p>
         </p:txBody>
       </p:sp>
+      <p:pic>
+        <p:nvPicPr>
+          <p:cNvPr id="4" name="Picture 3" descr="A chart with green and orange bars&#10;&#10;Description automatically generated">
+            <a:extLst>
+              <a:ext uri="{FF2B5EF4-FFF2-40B4-BE49-F238E27FC236}">
+                <a16:creationId xmlns:a16="http://schemas.microsoft.com/office/drawing/2014/main" id="{70731AD7-1560-46A2-A0FE-2D4B98F8BCE7}"/>
+              </a:ext>
+            </a:extLst>
+          </p:cNvPr>
+          <p:cNvPicPr>
+            <a:picLocks noChangeAspect="1"/>
+          </p:cNvPicPr>
+          <p:nvPr/>
+        </p:nvPicPr>
+        <p:blipFill>
+          <a:blip r:embed="rId3">
+            <a:extLst>
+              <a:ext uri="{28A0092B-C50C-407E-A947-70E740481C1C}">
+                <a14:useLocalDpi xmlns:a14="http://schemas.microsoft.com/office/drawing/2010/main" val="0"/>
+              </a:ext>
+            </a:extLst>
+          </a:blip>
+          <a:stretch>
+            <a:fillRect/>
+          </a:stretch>
+        </p:blipFill>
+        <p:spPr>
+          <a:xfrm>
+            <a:off x="109148" y="867865"/>
+            <a:ext cx="4442799" cy="3314470"/>
+          </a:xfrm>
+          <a:prstGeom prst="rect">
+            <a:avLst/>
+          </a:prstGeom>
+        </p:spPr>
+      </p:pic>
+      <p:pic>
+        <p:nvPicPr>
+          <p:cNvPr id="9" name="Picture 8" descr="A chart of a drum kit&#10;&#10;Description automatically generated">
+            <a:extLst>
+              <a:ext uri="{FF2B5EF4-FFF2-40B4-BE49-F238E27FC236}">
+                <a16:creationId xmlns:a16="http://schemas.microsoft.com/office/drawing/2014/main" id="{63CE04DE-D340-4EFC-4D4B-57DDA502107A}"/>
+              </a:ext>
+            </a:extLst>
+          </p:cNvPr>
+          <p:cNvPicPr>
+            <a:picLocks noChangeAspect="1"/>
+          </p:cNvPicPr>
+          <p:nvPr/>
+        </p:nvPicPr>
+        <p:blipFill>
+          <a:blip r:embed="rId4">
+            <a:extLst>
+              <a:ext uri="{28A0092B-C50C-407E-A947-70E740481C1C}">
+                <a14:useLocalDpi xmlns:a14="http://schemas.microsoft.com/office/drawing/2010/main" val="0"/>
+              </a:ext>
+            </a:extLst>
+          </a:blip>
+          <a:stretch>
+            <a:fillRect/>
+          </a:stretch>
+        </p:blipFill>
+        <p:spPr>
+          <a:xfrm>
+            <a:off x="4523873" y="867865"/>
+            <a:ext cx="4442800" cy="3314471"/>
+          </a:xfrm>
+          <a:prstGeom prst="rect">
+            <a:avLst/>
+          </a:prstGeom>
+        </p:spPr>
+      </p:pic>
     </p:spTree>
     <p:extLst>
       <p:ext uri="{BB962C8B-B14F-4D97-AF65-F5344CB8AC3E}">
-        <p14:creationId xmlns:p14="http://schemas.microsoft.com/office/powerpoint/2010/main" val="2351424666"/>
+        <p14:creationId xmlns:p14="http://schemas.microsoft.com/office/powerpoint/2010/main" val="443807632"/>
       </p:ext>
     </p:extLst>
   </p:cSld>
@@ -4932,7 +4339,7 @@
         <p:spPr>
           <a:xfrm>
             <a:off x="419302" y="243976"/>
-            <a:ext cx="8305401" cy="2154436"/>
+            <a:ext cx="8305401" cy="2308324"/>
           </a:xfrm>
         </p:spPr>
         <p:txBody>
@@ -4941,20 +4348,11 @@
           <a:p>
             <a:r>
               <a:rPr lang="en-US" dirty="0"/>
-              <a:t>Result Graphs</a:t>
+              <a:t>Comparison Graphs</a:t>
             </a:r>
             <a:br>
               <a:rPr lang="en-US" dirty="0"/>
             </a:br>
-            <a:r>
-              <a:rPr lang="en-US" sz="1600" b="0" kern="1200" spc="-5" dirty="0">
-                <a:solidFill>
-                  <a:srgbClr val="003358"/>
-                </a:solidFill>
-                <a:ea typeface="+mn-ea"/>
-              </a:rPr>
-              <a:t>plotted using the results from the MUSHRA Test.</a:t>
-            </a:r>
             <a:br>
               <a:rPr lang="en-US" dirty="0"/>
             </a:br>
@@ -4994,10 +4392,10 @@
       </p:sp>
       <p:pic>
         <p:nvPicPr>
-          <p:cNvPr id="2" name="Picture 1" descr="A graph of colored lines&#10;&#10;Description automatically generated">
+          <p:cNvPr id="4" name="Picture 3" descr="A graph of green and orange bars&#10;&#10;Description automatically generated">
             <a:extLst>
               <a:ext uri="{FF2B5EF4-FFF2-40B4-BE49-F238E27FC236}">
-                <a16:creationId xmlns:a16="http://schemas.microsoft.com/office/drawing/2014/main" id="{7A02010D-31FE-5D24-D138-75317DDD7C80}"/>
+                <a16:creationId xmlns:a16="http://schemas.microsoft.com/office/drawing/2014/main" id="{34063DB4-A39C-5BD7-E70B-9006EE482FDE}"/>
               </a:ext>
             </a:extLst>
           </p:cNvPr>
@@ -5007,15 +4405,21 @@
           <p:nvPr/>
         </p:nvPicPr>
         <p:blipFill>
-          <a:blip r:embed="rId3"/>
+          <a:blip r:embed="rId3">
+            <a:extLst>
+              <a:ext uri="{28A0092B-C50C-407E-A947-70E740481C1C}">
+                <a14:useLocalDpi xmlns:a14="http://schemas.microsoft.com/office/drawing/2010/main" val="0"/>
+              </a:ext>
+            </a:extLst>
+          </a:blip>
           <a:stretch>
             <a:fillRect/>
           </a:stretch>
         </p:blipFill>
         <p:spPr>
           <a:xfrm>
-            <a:off x="1600200" y="922004"/>
-            <a:ext cx="5943600" cy="3658870"/>
+            <a:off x="1981200" y="722107"/>
+            <a:ext cx="4906473" cy="3660385"/>
           </a:xfrm>
           <a:prstGeom prst="rect">
             <a:avLst/>
@@ -5025,7 +4429,7 @@
     </p:spTree>
     <p:extLst>
       <p:ext uri="{BB962C8B-B14F-4D97-AF65-F5344CB8AC3E}">
-        <p14:creationId xmlns:p14="http://schemas.microsoft.com/office/powerpoint/2010/main" val="2620491146"/>
+        <p14:creationId xmlns:p14="http://schemas.microsoft.com/office/powerpoint/2010/main" val="962826759"/>
       </p:ext>
     </p:extLst>
   </p:cSld>

</xml_diff>